<commit_message>
Final version of the initial presentation
</commit_message>
<xml_diff>
--- a/presentations/pdis1.pptx
+++ b/presentations/pdis1.pptx
@@ -202,7 +202,7 @@
             <a:fld id="{CFCF6AD8-7A09-4100-B9D8-1AE70CE17931}" type="datetimeFigureOut">
               <a:rPr lang="en-US" smtClean="0"/>
               <a:pPr/>
-              <a:t>5/9/2010</a:t>
+              <a:t>5/10/2010</a:t>
             </a:fld>
             <a:endParaRPr lang="en-US"/>
           </a:p>
@@ -691,7 +691,7 @@
         </p:nvSpPr>
         <p:spPr>
           <a:xfrm>
-            <a:off x="685800" y="2130425"/>
+            <a:off x="0" y="5387975"/>
             <a:ext cx="7772400" cy="1470025"/>
           </a:xfrm>
         </p:spPr>
@@ -719,14 +719,14 @@
         </p:nvSpPr>
         <p:spPr>
           <a:xfrm>
-            <a:off x="1371600" y="3886200"/>
+            <a:off x="2743200" y="0"/>
             <a:ext cx="6400800" cy="1752600"/>
           </a:xfrm>
         </p:spPr>
         <p:txBody>
           <a:bodyPr/>
           <a:lstStyle>
-            <a:lvl1pPr marL="0" indent="0" algn="ctr">
+            <a:lvl1pPr marL="0" indent="0" algn="r">
               <a:buNone/>
               <a:defRPr>
                 <a:solidFill>
@@ -844,7 +844,7 @@
             <a:fld id="{D152DF54-25FE-4726-A2C4-A49E5133F562}" type="datetime1">
               <a:rPr lang="en-US" smtClean="0"/>
               <a:pPr/>
-              <a:t>5/9/2010</a:t>
+              <a:t>5/10/2010</a:t>
             </a:fld>
             <a:endParaRPr lang="en-US"/>
           </a:p>
@@ -1011,7 +1011,7 @@
             <a:fld id="{FBC3CF1C-1A02-4F3A-B54C-A99E00D892E7}" type="datetime1">
               <a:rPr lang="en-US" smtClean="0"/>
               <a:pPr/>
-              <a:t>5/9/2010</a:t>
+              <a:t>5/10/2010</a:t>
             </a:fld>
             <a:endParaRPr lang="en-US"/>
           </a:p>
@@ -1188,7 +1188,7 @@
             <a:fld id="{E6DC7923-D324-4BC8-9BF7-BAFC14B0206A}" type="datetime1">
               <a:rPr lang="en-US" smtClean="0"/>
               <a:pPr/>
-              <a:t>5/9/2010</a:t>
+              <a:t>5/10/2010</a:t>
             </a:fld>
             <a:endParaRPr lang="en-US"/>
           </a:p>
@@ -1298,42 +1298,83 @@
         <p:spPr/>
         <p:txBody>
           <a:bodyPr/>
-          <a:lstStyle/>
+          <a:lstStyle>
+            <a:lvl1pPr>
+              <a:buClr>
+                <a:schemeClr val="bg1">
+                  <a:lumMod val="50000"/>
+                </a:schemeClr>
+              </a:buClr>
+              <a:defRPr/>
+            </a:lvl1pPr>
+            <a:lvl2pPr>
+              <a:buClr>
+                <a:schemeClr val="bg1">
+                  <a:lumMod val="50000"/>
+                </a:schemeClr>
+              </a:buClr>
+              <a:defRPr/>
+            </a:lvl2pPr>
+            <a:lvl3pPr>
+              <a:buClr>
+                <a:schemeClr val="bg1">
+                  <a:lumMod val="50000"/>
+                </a:schemeClr>
+              </a:buClr>
+              <a:defRPr/>
+            </a:lvl3pPr>
+            <a:lvl4pPr>
+              <a:buClr>
+                <a:schemeClr val="bg1">
+                  <a:lumMod val="50000"/>
+                </a:schemeClr>
+              </a:buClr>
+              <a:defRPr/>
+            </a:lvl4pPr>
+            <a:lvl5pPr>
+              <a:buClr>
+                <a:schemeClr val="bg1">
+                  <a:lumMod val="50000"/>
+                </a:schemeClr>
+              </a:buClr>
+              <a:defRPr/>
+            </a:lvl5pPr>
+          </a:lstStyle>
           <a:p>
             <a:pPr lvl="0"/>
             <a:r>
-              <a:rPr lang="en-US" smtClean="0"/>
+              <a:rPr lang="en-US" dirty="0" smtClean="0"/>
               <a:t>Click to edit Master text styles</a:t>
             </a:r>
           </a:p>
           <a:p>
             <a:pPr lvl="1"/>
             <a:r>
-              <a:rPr lang="en-US" smtClean="0"/>
+              <a:rPr lang="en-US" dirty="0" smtClean="0"/>
               <a:t>Second level</a:t>
             </a:r>
           </a:p>
           <a:p>
             <a:pPr lvl="2"/>
             <a:r>
-              <a:rPr lang="en-US" smtClean="0"/>
+              <a:rPr lang="en-US" dirty="0" smtClean="0"/>
               <a:t>Third level</a:t>
             </a:r>
           </a:p>
           <a:p>
             <a:pPr lvl="3"/>
             <a:r>
-              <a:rPr lang="en-US" smtClean="0"/>
+              <a:rPr lang="en-US" dirty="0" smtClean="0"/>
               <a:t>Fourth level</a:t>
             </a:r>
           </a:p>
           <a:p>
             <a:pPr lvl="4"/>
             <a:r>
-              <a:rPr lang="en-US" smtClean="0"/>
+              <a:rPr lang="en-US" dirty="0" smtClean="0"/>
               <a:t>Fifth level</a:t>
             </a:r>
-            <a:endParaRPr lang="en-US"/>
+            <a:endParaRPr lang="en-US" dirty="0"/>
           </a:p>
         </p:txBody>
       </p:sp>
@@ -1355,7 +1396,7 @@
             <a:fld id="{44A65452-C42D-4071-9AFC-FE25FA090C9C}" type="datetime1">
               <a:rPr lang="en-US" smtClean="0"/>
               <a:pPr/>
-              <a:t>5/9/2010</a:t>
+              <a:t>5/10/2010</a:t>
             </a:fld>
             <a:endParaRPr lang="en-US"/>
           </a:p>
@@ -1393,14 +1434,24 @@
         <p:spPr/>
         <p:txBody>
           <a:bodyPr/>
-          <a:lstStyle/>
+          <a:lstStyle>
+            <a:lvl1pPr>
+              <a:defRPr sz="1400" b="0">
+                <a:solidFill>
+                  <a:schemeClr val="accent1">
+                    <a:lumMod val="50000"/>
+                  </a:schemeClr>
+                </a:solidFill>
+              </a:defRPr>
+            </a:lvl1pPr>
+          </a:lstStyle>
           <a:p>
             <a:fld id="{B6F15528-21DE-4FAA-801E-634DDDAF4B2B}" type="slidenum">
               <a:rPr lang="en-US" smtClean="0"/>
               <a:pPr/>
               <a:t>‹#›</a:t>
             </a:fld>
-            <a:endParaRPr lang="en-US"/>
+            <a:endParaRPr lang="en-US" dirty="0"/>
           </a:p>
         </p:txBody>
       </p:sp>
@@ -1598,7 +1649,7 @@
             <a:fld id="{0F743A9E-C184-481E-87BD-0F0D56047404}" type="datetime1">
               <a:rPr lang="en-US" smtClean="0"/>
               <a:pPr/>
-              <a:t>5/9/2010</a:t>
+              <a:t>5/10/2010</a:t>
             </a:fld>
             <a:endParaRPr lang="en-US"/>
           </a:p>
@@ -1883,7 +1934,7 @@
             <a:fld id="{974A8010-2A62-4C06-9569-C5481F98A9B8}" type="datetime1">
               <a:rPr lang="en-US" smtClean="0"/>
               <a:pPr/>
-              <a:t>5/9/2010</a:t>
+              <a:t>5/10/2010</a:t>
             </a:fld>
             <a:endParaRPr lang="en-US"/>
           </a:p>
@@ -2302,7 +2353,7 @@
             <a:fld id="{6382FBE8-0209-4CDC-8BB9-0E743243CA23}" type="datetime1">
               <a:rPr lang="en-US" smtClean="0"/>
               <a:pPr/>
-              <a:t>5/9/2010</a:t>
+              <a:t>5/10/2010</a:t>
             </a:fld>
             <a:endParaRPr lang="en-US"/>
           </a:p>
@@ -2417,7 +2468,7 @@
             <a:fld id="{979EA3E0-2703-4015-99E8-D9C11011A436}" type="datetime1">
               <a:rPr lang="en-US" smtClean="0"/>
               <a:pPr/>
-              <a:t>5/9/2010</a:t>
+              <a:t>5/10/2010</a:t>
             </a:fld>
             <a:endParaRPr lang="en-US"/>
           </a:p>
@@ -2509,7 +2560,7 @@
             <a:fld id="{BDEAB48B-CDE6-44A6-8EE4-B51DA18DCC06}" type="datetime1">
               <a:rPr lang="en-US" smtClean="0"/>
               <a:pPr/>
-              <a:t>5/9/2010</a:t>
+              <a:t>5/10/2010</a:t>
             </a:fld>
             <a:endParaRPr lang="en-US"/>
           </a:p>
@@ -2783,7 +2834,7 @@
             <a:fld id="{A05EB600-233D-4993-9A0C-A734F7C6002E}" type="datetime1">
               <a:rPr lang="en-US" smtClean="0"/>
               <a:pPr/>
-              <a:t>5/9/2010</a:t>
+              <a:t>5/10/2010</a:t>
             </a:fld>
             <a:endParaRPr lang="en-US"/>
           </a:p>
@@ -3033,7 +3084,7 @@
             <a:fld id="{C5A2777C-3BAD-4973-8F82-C580DE89C960}" type="datetime1">
               <a:rPr lang="en-US" smtClean="0"/>
               <a:pPr/>
-              <a:t>5/9/2010</a:t>
+              <a:t>5/10/2010</a:t>
             </a:fld>
             <a:endParaRPr lang="en-US"/>
           </a:p>
@@ -3172,38 +3223,38 @@
           <a:p>
             <a:pPr lvl="0"/>
             <a:r>
-              <a:rPr lang="en-US" smtClean="0"/>
+              <a:rPr lang="en-US" dirty="0" smtClean="0"/>
               <a:t>Click to edit Master text styles</a:t>
             </a:r>
           </a:p>
           <a:p>
             <a:pPr lvl="1"/>
             <a:r>
-              <a:rPr lang="en-US" smtClean="0"/>
+              <a:rPr lang="en-US" dirty="0" smtClean="0"/>
               <a:t>Second level</a:t>
             </a:r>
           </a:p>
           <a:p>
             <a:pPr lvl="2"/>
             <a:r>
-              <a:rPr lang="en-US" smtClean="0"/>
+              <a:rPr lang="en-US" dirty="0" smtClean="0"/>
               <a:t>Third level</a:t>
             </a:r>
           </a:p>
           <a:p>
             <a:pPr lvl="3"/>
             <a:r>
-              <a:rPr lang="en-US" smtClean="0"/>
+              <a:rPr lang="en-US" dirty="0" smtClean="0"/>
               <a:t>Fourth level</a:t>
             </a:r>
           </a:p>
           <a:p>
             <a:pPr lvl="4"/>
             <a:r>
-              <a:rPr lang="en-US" smtClean="0"/>
+              <a:rPr lang="en-US" dirty="0" smtClean="0"/>
               <a:t>Fifth level</a:t>
             </a:r>
-            <a:endParaRPr lang="en-US"/>
+            <a:endParaRPr lang="en-US" dirty="0"/>
           </a:p>
         </p:txBody>
       </p:sp>
@@ -3243,7 +3294,7 @@
             <a:fld id="{F818FC3B-9732-4FFA-B46E-00DD30FA6554}" type="datetime1">
               <a:rPr lang="en-US" smtClean="0"/>
               <a:pPr/>
-              <a:t>5/9/2010</a:t>
+              <a:t>5/10/2010</a:t>
             </a:fld>
             <a:endParaRPr lang="en-US"/>
           </a:p>
@@ -3347,14 +3398,16 @@
   <p:hf hdr="0" ftr="0" dt="0"/>
   <p:txStyles>
     <p:titleStyle>
-      <a:lvl1pPr algn="ctr" defTabSz="914400" rtl="0" eaLnBrk="1" latinLnBrk="0" hangingPunct="1">
+      <a:lvl1pPr algn="r" defTabSz="914400" rtl="0" eaLnBrk="1" latinLnBrk="0" hangingPunct="1">
         <a:spcBef>
           <a:spcPct val="0"/>
         </a:spcBef>
         <a:buNone/>
-        <a:defRPr sz="4400" kern="1200">
+        <a:defRPr sz="4400" b="1" kern="1200">
           <a:solidFill>
-            <a:schemeClr val="tx1"/>
+            <a:schemeClr val="accent1">
+              <a:lumMod val="50000"/>
+            </a:schemeClr>
           </a:solidFill>
           <a:latin typeface="+mj-lt"/>
           <a:ea typeface="+mj-ea"/>
@@ -3367,6 +3420,14 @@
         <a:spcBef>
           <a:spcPct val="20000"/>
         </a:spcBef>
+        <a:spcAft>
+          <a:spcPts val="600"/>
+        </a:spcAft>
+        <a:buClr>
+          <a:schemeClr val="bg1">
+            <a:lumMod val="75000"/>
+          </a:schemeClr>
+        </a:buClr>
         <a:buFont typeface="Arial" pitchFamily="34" charset="0"/>
         <a:buChar char="•"/>
         <a:defRPr sz="3200" kern="1200">
@@ -3382,6 +3443,11 @@
         <a:spcBef>
           <a:spcPct val="20000"/>
         </a:spcBef>
+        <a:buClr>
+          <a:schemeClr val="bg1">
+            <a:lumMod val="75000"/>
+          </a:schemeClr>
+        </a:buClr>
         <a:buFont typeface="Arial" pitchFamily="34" charset="0"/>
         <a:buChar char="–"/>
         <a:defRPr sz="2800" kern="1200">
@@ -3397,6 +3463,11 @@
         <a:spcBef>
           <a:spcPct val="20000"/>
         </a:spcBef>
+        <a:buClr>
+          <a:schemeClr val="bg1">
+            <a:lumMod val="75000"/>
+          </a:schemeClr>
+        </a:buClr>
         <a:buFont typeface="Arial" pitchFamily="34" charset="0"/>
         <a:buChar char="•"/>
         <a:defRPr sz="2400" kern="1200">
@@ -3412,6 +3483,11 @@
         <a:spcBef>
           <a:spcPct val="20000"/>
         </a:spcBef>
+        <a:buClr>
+          <a:schemeClr val="bg1">
+            <a:lumMod val="75000"/>
+          </a:schemeClr>
+        </a:buClr>
         <a:buFont typeface="Arial" pitchFamily="34" charset="0"/>
         <a:buChar char="–"/>
         <a:defRPr sz="2000" kern="1200">
@@ -3427,6 +3503,11 @@
         <a:spcBef>
           <a:spcPct val="20000"/>
         </a:spcBef>
+        <a:buClr>
+          <a:schemeClr val="bg1">
+            <a:lumMod val="75000"/>
+          </a:schemeClr>
+        </a:buClr>
         <a:buFont typeface="Arial" pitchFamily="34" charset="0"/>
         <a:buChar char="»"/>
         <a:defRPr sz="2000" kern="1200">
@@ -3601,6 +3682,16 @@
 <file path=ppt/slides/slide1.xml><?xml version="1.0" encoding="utf-8"?>
 <p:sld xmlns:a="http://schemas.openxmlformats.org/drawingml/2006/main" xmlns:r="http://schemas.openxmlformats.org/officeDocument/2006/relationships" xmlns:p="http://schemas.openxmlformats.org/presentationml/2006/main">
   <p:cSld>
+    <p:bg>
+      <p:bgPr>
+        <a:solidFill>
+          <a:schemeClr val="accent1">
+            <a:lumMod val="50000"/>
+          </a:schemeClr>
+        </a:solidFill>
+        <a:effectLst/>
+      </p:bgPr>
+    </p:bg>
     <p:spTree>
       <p:nvGrpSpPr>
         <p:cNvPr id="1" name=""/>
@@ -3625,18 +3716,32 @@
             <p:ph type="ctrTitle"/>
           </p:nvPr>
         </p:nvSpPr>
-        <p:spPr/>
+        <p:spPr>
+          <a:xfrm>
+            <a:off x="952500" y="1524000"/>
+            <a:ext cx="7239000" cy="1927225"/>
+          </a:xfrm>
+        </p:spPr>
         <p:txBody>
           <a:bodyPr>
             <a:normAutofit fontScale="90000"/>
           </a:bodyPr>
           <a:lstStyle/>
           <a:p>
-            <a:r>
-              <a:rPr lang="en-US" dirty="0" smtClean="0"/>
+            <a:pPr algn="ctr"/>
+            <a:r>
+              <a:rPr lang="en-US" b="1" dirty="0" smtClean="0">
+                <a:solidFill>
+                  <a:schemeClr val="bg1"/>
+                </a:solidFill>
+              </a:rPr>
               <a:t>End-User Reconfiguration of Applications using Adaptive Object-Models</a:t>
             </a:r>
-            <a:endParaRPr lang="en-US" dirty="0"/>
+            <a:endParaRPr lang="en-US" b="1" dirty="0">
+              <a:solidFill>
+                <a:schemeClr val="bg1"/>
+              </a:solidFill>
+            </a:endParaRPr>
           </a:p>
         </p:txBody>
       </p:sp>
@@ -3650,22 +3755,118 @@
             <p:ph type="subTitle" idx="1"/>
           </p:nvPr>
         </p:nvSpPr>
-        <p:spPr/>
-        <p:txBody>
-          <a:bodyPr/>
-          <a:lstStyle/>
-          <a:p>
-            <a:r>
-              <a:rPr lang="pt-PT" dirty="0" smtClean="0"/>
+        <p:spPr>
+          <a:xfrm>
+            <a:off x="1371600" y="4495800"/>
+            <a:ext cx="6400800" cy="1219200"/>
+          </a:xfrm>
+        </p:spPr>
+        <p:txBody>
+          <a:bodyPr>
+            <a:normAutofit lnSpcReduction="10000"/>
+          </a:bodyPr>
+          <a:lstStyle/>
+          <a:p>
+            <a:pPr algn="ctr"/>
+            <a:r>
+              <a:rPr lang="pt-PT" dirty="0" smtClean="0">
+                <a:solidFill>
+                  <a:schemeClr val="bg1">
+                    <a:lumMod val="75000"/>
+                  </a:schemeClr>
+                </a:solidFill>
+              </a:rPr>
               <a:t>February 2010</a:t>
             </a:r>
           </a:p>
           <a:p>
-            <a:r>
-              <a:rPr lang="pt-PT" dirty="0" smtClean="0"/>
+            <a:pPr algn="ctr"/>
+            <a:r>
+              <a:rPr lang="pt-PT" dirty="0" smtClean="0">
+                <a:solidFill>
+                  <a:schemeClr val="bg1">
+                    <a:lumMod val="75000"/>
+                  </a:schemeClr>
+                </a:solidFill>
+              </a:rPr>
               <a:t>FEUP</a:t>
             </a:r>
-            <a:endParaRPr lang="en-US" dirty="0"/>
+            <a:endParaRPr lang="en-US" sz="2000" dirty="0">
+              <a:solidFill>
+                <a:schemeClr val="bg1">
+                  <a:lumMod val="75000"/>
+                </a:schemeClr>
+              </a:solidFill>
+            </a:endParaRPr>
+          </a:p>
+        </p:txBody>
+      </p:sp>
+      <p:sp>
+        <p:nvSpPr>
+          <p:cNvPr id="5" name="Rectangle 4"/>
+          <p:cNvSpPr/>
+          <p:nvPr/>
+        </p:nvSpPr>
+        <p:spPr>
+          <a:xfrm>
+            <a:off x="228600" y="6324600"/>
+            <a:ext cx="3581400" cy="369332"/>
+          </a:xfrm>
+          <a:prstGeom prst="rect">
+            <a:avLst/>
+          </a:prstGeom>
+        </p:spPr>
+        <p:txBody>
+          <a:bodyPr wrap="square">
+            <a:spAutoFit/>
+          </a:bodyPr>
+          <a:lstStyle/>
+          <a:p>
+            <a:r>
+              <a:rPr lang="pt-PT" dirty="0" smtClean="0">
+                <a:solidFill>
+                  <a:schemeClr val="bg1">
+                    <a:lumMod val="75000"/>
+                  </a:schemeClr>
+                </a:solidFill>
+              </a:rPr>
+              <a:t>Supervisor – Ademar Aguiar</a:t>
+            </a:r>
+          </a:p>
+        </p:txBody>
+      </p:sp>
+      <p:sp>
+        <p:nvSpPr>
+          <p:cNvPr id="6" name="Rectangle 5"/>
+          <p:cNvSpPr/>
+          <p:nvPr/>
+        </p:nvSpPr>
+        <p:spPr>
+          <a:xfrm>
+            <a:off x="5334000" y="6324600"/>
+            <a:ext cx="3581400" cy="369332"/>
+          </a:xfrm>
+          <a:prstGeom prst="rect">
+            <a:avLst/>
+          </a:prstGeom>
+        </p:spPr>
+        <p:txBody>
+          <a:bodyPr wrap="square">
+            <a:spAutoFit/>
+          </a:bodyPr>
+          <a:lstStyle/>
+          <a:p>
+            <a:pPr algn="r"/>
+            <a:r>
+              <a:rPr lang="pt-PT" dirty="0" smtClean="0">
+                <a:solidFill>
+                  <a:schemeClr val="bg1">
+                    <a:lumMod val="75000"/>
+                  </a:schemeClr>
+                </a:solidFill>
+              </a:rPr>
+              <a:t>Co-supervisor – Hugo Ferreira</a:t>
+            </a:r>
           </a:p>
         </p:txBody>
       </p:sp>
@@ -3674,6 +3875,13 @@
   <p:clrMapOvr>
     <a:masterClrMapping/>
   </p:clrMapOvr>
+  <p:timing>
+    <p:tnLst>
+      <p:par>
+        <p:cTn id="1" dur="indefinite" restart="never" nodeType="tmRoot"/>
+      </p:par>
+    </p:tnLst>
+  </p:timing>
 </p:sld>
 </file>
 
@@ -3696,25 +3904,6 @@
       </p:grpSpPr>
       <p:sp>
         <p:nvSpPr>
-          <p:cNvPr id="2" name="Title 1"/>
-          <p:cNvSpPr>
-            <a:spLocks noGrp="1"/>
-          </p:cNvSpPr>
-          <p:nvPr>
-            <p:ph type="title"/>
-          </p:nvPr>
-        </p:nvSpPr>
-        <p:spPr/>
-        <p:txBody>
-          <a:bodyPr/>
-          <a:lstStyle/>
-          <a:p>
-            <a:endParaRPr lang="en-US"/>
-          </a:p>
-        </p:txBody>
-      </p:sp>
-      <p:sp>
-        <p:nvSpPr>
           <p:cNvPr id="3" name="Content Placeholder 2"/>
           <p:cNvSpPr>
             <a:spLocks noGrp="1"/>
@@ -3723,7 +3912,12 @@
             <p:ph idx="1"/>
           </p:nvPr>
         </p:nvSpPr>
-        <p:spPr/>
+        <p:spPr>
+          <a:xfrm>
+            <a:off x="457200" y="1600201"/>
+            <a:ext cx="8229600" cy="4038600"/>
+          </a:xfrm>
+        </p:spPr>
         <p:txBody>
           <a:bodyPr anchor="ctr">
             <a:normAutofit/>
@@ -3734,10 +3928,22 @@
               <a:buNone/>
             </a:pPr>
             <a:r>
-              <a:rPr lang="pt-PT" sz="18000" b="1" dirty="0" smtClean="0"/>
+              <a:rPr lang="pt-PT" sz="18000" b="1" dirty="0" smtClean="0">
+                <a:solidFill>
+                  <a:schemeClr val="accent1">
+                    <a:lumMod val="50000"/>
+                  </a:schemeClr>
+                </a:solidFill>
+              </a:rPr>
               <a:t>?</a:t>
             </a:r>
-            <a:endParaRPr lang="en-US" sz="18000" b="1" dirty="0"/>
+            <a:endParaRPr lang="en-US" sz="18000" b="1" dirty="0">
+              <a:solidFill>
+                <a:schemeClr val="accent1">
+                  <a:lumMod val="50000"/>
+                </a:schemeClr>
+              </a:solidFill>
+            </a:endParaRPr>
           </a:p>
         </p:txBody>
       </p:sp>
@@ -3837,7 +4043,11 @@
           <a:p>
             <a:r>
               <a:rPr lang="pt-PT" dirty="0" smtClean="0"/>
-              <a:t>Most software projects exist in an ever-changing environment</a:t>
+              <a:t>Many </a:t>
+            </a:r>
+            <a:r>
+              <a:rPr lang="pt-PT" dirty="0" smtClean="0"/>
+              <a:t>software projects exist in an ever-changing environment</a:t>
             </a:r>
           </a:p>
           <a:p>
@@ -3890,6 +4100,13 @@
   <p:clrMapOvr>
     <a:masterClrMapping/>
   </p:clrMapOvr>
+  <p:timing>
+    <p:tnLst>
+      <p:par>
+        <p:cTn id="1" dur="indefinite" restart="never" nodeType="tmRoot"/>
+      </p:par>
+    </p:tnLst>
+  </p:timing>
 </p:sld>
 </file>
 
@@ -4008,6 +4225,13 @@
   <p:clrMapOvr>
     <a:masterClrMapping/>
   </p:clrMapOvr>
+  <p:timing>
+    <p:tnLst>
+      <p:par>
+        <p:cTn id="1" dur="indefinite" restart="never" nodeType="tmRoot"/>
+      </p:par>
+    </p:tnLst>
+  </p:timing>
 </p:sld>
 </file>
 
@@ -4083,7 +4307,7 @@
               <a:buNone/>
             </a:pPr>
             <a:r>
-              <a:rPr lang="pt-PT" sz="6000" dirty="0" smtClean="0"/>
+              <a:rPr lang="pt-PT" sz="6000" b="1" dirty="0" smtClean="0"/>
               <a:t>AOM</a:t>
             </a:r>
           </a:p>
@@ -4118,6 +4342,13 @@
   <p:clrMapOvr>
     <a:masterClrMapping/>
   </p:clrMapOvr>
+  <p:timing>
+    <p:tnLst>
+      <p:par>
+        <p:cTn id="1" dur="indefinite" restart="never" nodeType="tmRoot"/>
+      </p:par>
+    </p:tnLst>
+  </p:timing>
 </p:sld>
 </file>
 
@@ -4224,6 +4455,13 @@
   <p:clrMapOvr>
     <a:masterClrMapping/>
   </p:clrMapOvr>
+  <p:timing>
+    <p:tnLst>
+      <p:par>
+        <p:cTn id="1" dur="indefinite" restart="never" nodeType="tmRoot"/>
+      </p:par>
+    </p:tnLst>
+  </p:timing>
 </p:sld>
 </file>
 
@@ -4320,10 +4558,7 @@
               <a:avLst/>
             </a:prstGeom>
             <a:solidFill>
-              <a:schemeClr val="tx2">
-                <a:lumMod val="60000"/>
-                <a:lumOff val="40000"/>
-              </a:schemeClr>
+              <a:schemeClr val="accent1"/>
             </a:solidFill>
           </p:spPr>
           <p:style>
@@ -4417,7 +4652,7 @@
             <a:p>
               <a:r>
                 <a:rPr lang="pt-PT" sz="3200" b="1" dirty="0" smtClean="0"/>
-                <a:t>System Data</a:t>
+                <a:t>System data</a:t>
               </a:r>
               <a:endParaRPr lang="en-US" sz="3200" b="1" dirty="0"/>
             </a:p>
@@ -4453,10 +4688,7 @@
               <a:avLst/>
             </a:prstGeom>
             <a:solidFill>
-              <a:schemeClr val="tx2">
-                <a:lumMod val="60000"/>
-                <a:lumOff val="40000"/>
-              </a:schemeClr>
+              <a:schemeClr val="accent1"/>
             </a:solidFill>
           </p:spPr>
           <p:style>
@@ -4586,10 +4818,7 @@
               <a:avLst/>
             </a:prstGeom>
             <a:solidFill>
-              <a:schemeClr val="tx2">
-                <a:lumMod val="60000"/>
-                <a:lumOff val="40000"/>
-              </a:schemeClr>
+              <a:schemeClr val="accent1"/>
             </a:solidFill>
           </p:spPr>
           <p:style>
@@ -4695,6 +4924,13 @@
   <p:clrMapOvr>
     <a:masterClrMapping/>
   </p:clrMapOvr>
+  <p:timing>
+    <p:tnLst>
+      <p:par>
+        <p:cTn id="1" dur="indefinite" restart="never" nodeType="tmRoot"/>
+      </p:par>
+    </p:tnLst>
+  </p:timing>
 </p:sld>
 </file>
 
@@ -4751,7 +4987,7 @@
         <p:spPr/>
         <p:txBody>
           <a:bodyPr>
-            <a:normAutofit lnSpcReduction="10000"/>
+            <a:normAutofit/>
           </a:bodyPr>
           <a:lstStyle/>
           <a:p>
@@ -4769,27 +5005,16 @@
           <a:p>
             <a:r>
               <a:rPr lang="pt-PT" dirty="0" smtClean="0"/>
-              <a:t>Allows for the easy creation of highly-customizable information systems</a:t>
-            </a:r>
-          </a:p>
-          <a:p>
+              <a:t>Allows for the easy creation of </a:t>
+            </a:r>
             <a:r>
               <a:rPr lang="pt-PT" dirty="0" smtClean="0"/>
-              <a:t>?Provides an architecture that allows end-users to model the system they’re using? </a:t>
-            </a:r>
-            <a:r>
-              <a:rPr lang="pt-PT" dirty="0" smtClean="0">
-                <a:solidFill>
-                  <a:schemeClr val="bg1">
-                    <a:lumMod val="75000"/>
-                  </a:schemeClr>
-                </a:solidFill>
-              </a:rPr>
-              <a:t>(é capaz de fazer mais sentido no próximo slide, 2º ponto)</a:t>
-            </a:r>
-          </a:p>
-          <a:p>
-            <a:endParaRPr lang="pt-PT" dirty="0" smtClean="0"/>
+              <a:t>highly-customizable, dynamic </a:t>
+            </a:r>
+            <a:r>
+              <a:rPr lang="pt-PT" dirty="0" smtClean="0"/>
+              <a:t>information systems</a:t>
+            </a:r>
           </a:p>
           <a:p>
             <a:endParaRPr lang="en-US" dirty="0"/>
@@ -4825,6 +5050,13 @@
   <p:clrMapOvr>
     <a:masterClrMapping/>
   </p:clrMapOvr>
+  <p:timing>
+    <p:tnLst>
+      <p:par>
+        <p:cTn id="1" dur="indefinite" restart="never" nodeType="tmRoot"/>
+      </p:par>
+    </p:tnLst>
+  </p:timing>
 </p:sld>
 </file>
 
@@ -4881,7 +5113,7 @@
         <p:spPr/>
         <p:txBody>
           <a:bodyPr>
-            <a:normAutofit/>
+            <a:normAutofit lnSpcReduction="10000"/>
           </a:bodyPr>
           <a:lstStyle/>
           <a:p>
@@ -4949,6 +5181,13 @@
   <p:clrMapOvr>
     <a:masterClrMapping/>
   </p:clrMapOvr>
+  <p:timing>
+    <p:tnLst>
+      <p:par>
+        <p:cTn id="1" dur="indefinite" restart="never" nodeType="tmRoot"/>
+      </p:par>
+    </p:tnLst>
+  </p:timing>
 </p:sld>
 </file>
 
@@ -5016,7 +5255,15 @@
             <a:pPr lvl="1"/>
             <a:r>
               <a:rPr lang="pt-PT" dirty="0" smtClean="0"/>
-              <a:t>AOM architectures and inherent design patterns</a:t>
+              <a:t>AOM </a:t>
+            </a:r>
+            <a:r>
+              <a:rPr lang="pt-PT" dirty="0" smtClean="0"/>
+              <a:t>architecture </a:t>
+            </a:r>
+            <a:r>
+              <a:rPr lang="pt-PT" dirty="0" smtClean="0"/>
+              <a:t>and inherent design patterns</a:t>
             </a:r>
           </a:p>
           <a:p>
@@ -5035,7 +5282,15 @@
             <a:pPr lvl="1"/>
             <a:r>
               <a:rPr lang="pt-PT" dirty="0" smtClean="0"/>
-              <a:t>Possible implementation of an AOM system in Ruby</a:t>
+              <a:t>Including </a:t>
+            </a:r>
+            <a:r>
+              <a:rPr lang="pt-PT" dirty="0" smtClean="0"/>
+              <a:t>a possible </a:t>
+            </a:r>
+            <a:r>
+              <a:rPr lang="pt-PT" dirty="0" smtClean="0"/>
+              <a:t>implementation of an AOM system in Ruby</a:t>
             </a:r>
           </a:p>
           <a:p>
@@ -5076,6 +5331,13 @@
   <p:clrMapOvr>
     <a:masterClrMapping/>
   </p:clrMapOvr>
+  <p:timing>
+    <p:tnLst>
+      <p:par>
+        <p:cTn id="1" dur="indefinite" restart="never" nodeType="tmRoot"/>
+      </p:par>
+    </p:tnLst>
+  </p:timing>
 </p:sld>
 </file>
 

</xml_diff>